<commit_message>
made changes to docker-compose.yaml and MLOps ppt
</commit_message>
<xml_diff>
--- a/documents/MLOps.pptx
+++ b/documents/MLOps.pptx
@@ -243,7 +243,7 @@
           <a:p>
             <a:fld id="{E96E968B-C467-A949-A62E-78412354D811}" type="datetimeFigureOut">
               <a:rPr lang="en-US" smtClean="0"/>
-              <a:t>5/16/23</a:t>
+              <a:t>6/7/23</a:t>
             </a:fld>
             <a:endParaRPr lang="en-US"/>
           </a:p>
@@ -3579,7 +3579,7 @@
           <a:p>
             <a:fld id="{27DC006C-1A57-1F42-83B1-8B8B3292812E}" type="datetimeFigureOut">
               <a:rPr lang="en-US" smtClean="0"/>
-              <a:t>5/16/23</a:t>
+              <a:t>6/7/23</a:t>
             </a:fld>
             <a:endParaRPr lang="en-US"/>
           </a:p>
@@ -3777,7 +3777,7 @@
           <a:p>
             <a:fld id="{27DC006C-1A57-1F42-83B1-8B8B3292812E}" type="datetimeFigureOut">
               <a:rPr lang="en-US" smtClean="0"/>
-              <a:t>5/16/23</a:t>
+              <a:t>6/7/23</a:t>
             </a:fld>
             <a:endParaRPr lang="en-US"/>
           </a:p>
@@ -3985,7 +3985,7 @@
           <a:p>
             <a:fld id="{27DC006C-1A57-1F42-83B1-8B8B3292812E}" type="datetimeFigureOut">
               <a:rPr lang="en-US" smtClean="0"/>
-              <a:t>5/16/23</a:t>
+              <a:t>6/7/23</a:t>
             </a:fld>
             <a:endParaRPr lang="en-US"/>
           </a:p>
@@ -4549,7 +4549,7 @@
           <a:p>
             <a:fld id="{27DC006C-1A57-1F42-83B1-8B8B3292812E}" type="datetimeFigureOut">
               <a:rPr lang="en-US" smtClean="0"/>
-              <a:t>5/16/23</a:t>
+              <a:t>6/7/23</a:t>
             </a:fld>
             <a:endParaRPr lang="en-US"/>
           </a:p>
@@ -4824,7 +4824,7 @@
           <a:p>
             <a:fld id="{27DC006C-1A57-1F42-83B1-8B8B3292812E}" type="datetimeFigureOut">
               <a:rPr lang="en-US" smtClean="0"/>
-              <a:t>5/16/23</a:t>
+              <a:t>6/7/23</a:t>
             </a:fld>
             <a:endParaRPr lang="en-US"/>
           </a:p>
@@ -5089,7 +5089,7 @@
           <a:p>
             <a:fld id="{27DC006C-1A57-1F42-83B1-8B8B3292812E}" type="datetimeFigureOut">
               <a:rPr lang="en-US" smtClean="0"/>
-              <a:t>5/16/23</a:t>
+              <a:t>6/7/23</a:t>
             </a:fld>
             <a:endParaRPr lang="en-US"/>
           </a:p>
@@ -5501,7 +5501,7 @@
           <a:p>
             <a:fld id="{27DC006C-1A57-1F42-83B1-8B8B3292812E}" type="datetimeFigureOut">
               <a:rPr lang="en-US" smtClean="0"/>
-              <a:t>5/16/23</a:t>
+              <a:t>6/7/23</a:t>
             </a:fld>
             <a:endParaRPr lang="en-US"/>
           </a:p>
@@ -5642,7 +5642,7 @@
           <a:p>
             <a:fld id="{27DC006C-1A57-1F42-83B1-8B8B3292812E}" type="datetimeFigureOut">
               <a:rPr lang="en-US" smtClean="0"/>
-              <a:t>5/16/23</a:t>
+              <a:t>6/7/23</a:t>
             </a:fld>
             <a:endParaRPr lang="en-US"/>
           </a:p>
@@ -5755,7 +5755,7 @@
           <a:p>
             <a:fld id="{27DC006C-1A57-1F42-83B1-8B8B3292812E}" type="datetimeFigureOut">
               <a:rPr lang="en-US" smtClean="0"/>
-              <a:t>5/16/23</a:t>
+              <a:t>6/7/23</a:t>
             </a:fld>
             <a:endParaRPr lang="en-US"/>
           </a:p>
@@ -6066,7 +6066,7 @@
           <a:p>
             <a:fld id="{27DC006C-1A57-1F42-83B1-8B8B3292812E}" type="datetimeFigureOut">
               <a:rPr lang="en-US" smtClean="0"/>
-              <a:t>5/16/23</a:t>
+              <a:t>6/7/23</a:t>
             </a:fld>
             <a:endParaRPr lang="en-US"/>
           </a:p>
@@ -6354,7 +6354,7 @@
           <a:p>
             <a:fld id="{27DC006C-1A57-1F42-83B1-8B8B3292812E}" type="datetimeFigureOut">
               <a:rPr lang="en-US" smtClean="0"/>
-              <a:t>5/16/23</a:t>
+              <a:t>6/7/23</a:t>
             </a:fld>
             <a:endParaRPr lang="en-US"/>
           </a:p>
@@ -6595,7 +6595,7 @@
           <a:p>
             <a:fld id="{27DC006C-1A57-1F42-83B1-8B8B3292812E}" type="datetimeFigureOut">
               <a:rPr lang="en-US" smtClean="0"/>
-              <a:t>5/16/23</a:t>
+              <a:t>6/7/23</a:t>
             </a:fld>
             <a:endParaRPr lang="en-US"/>
           </a:p>
@@ -8081,7 +8081,7 @@
         <p:spPr>
           <a:xfrm>
             <a:off x="8727621" y="1134836"/>
-            <a:ext cx="2873829" cy="3416320"/>
+            <a:ext cx="2873829" cy="3970318"/>
           </a:xfrm>
           <a:prstGeom prst="rect">
             <a:avLst/>
@@ -8151,7 +8151,25 @@
                 </a:solidFill>
                 <a:effectLst/>
               </a:rPr>
-              <a:t>Output of this step is a trained model.</a:t>
+              <a:t>Output of this step is a trained model (and other model related artifacts like </a:t>
+            </a:r>
+            <a:r>
+              <a:rPr lang="en-US" b="0" i="0" u="none" strike="noStrike" dirty="0" err="1">
+                <a:solidFill>
+                  <a:srgbClr val="202124"/>
+                </a:solidFill>
+                <a:effectLst/>
+              </a:rPr>
+              <a:t>LoRA</a:t>
+            </a:r>
+            <a:r>
+              <a:rPr lang="en-US" b="0" i="0" u="none" strike="noStrike">
+                <a:solidFill>
+                  <a:srgbClr val="202124"/>
+                </a:solidFill>
+                <a:effectLst/>
+              </a:rPr>
+              <a:t> files).</a:t>
             </a:r>
             <a:endParaRPr lang="en-US" dirty="0"/>
           </a:p>

</xml_diff>